<commit_message>
MU - Resultados y correcciones
</commit_message>
<xml_diff>
--- a/Memoria/Figuras.pptx
+++ b/Memoria/Figuras.pptx
@@ -6,6 +6,7 @@
   </p:sldMasterIdLst>
   <p:sldIdLst>
     <p:sldId id="256" r:id="rId2"/>
+    <p:sldId id="257" r:id="rId3"/>
   </p:sldIdLst>
   <p:sldSz cx="12192000" cy="6858000"/>
   <p:notesSz cx="6858000" cy="9144000"/>
@@ -104,6 +105,11 @@
       </a:defRPr>
     </a:lvl9pPr>
   </p:defaultTextStyle>
+  <p:extLst>
+    <p:ext uri="{EFAFB233-063F-42B5-8137-9DF3F51BA10A}">
+      <p15:sldGuideLst xmlns:p15="http://schemas.microsoft.com/office/powerpoint/2012/main"/>
+    </p:ext>
+  </p:extLst>
 </p:presentation>
 </file>
 
@@ -254,7 +260,7 @@
           <a:p>
             <a:fld id="{C25A0614-AFE8-4CA8-A782-9126583F0A08}" type="datetimeFigureOut">
               <a:rPr lang="es-ES" smtClean="0"/>
-              <a:t>06/06/2019</a:t>
+              <a:t>08/06/2019</a:t>
             </a:fld>
             <a:endParaRPr lang="es-ES"/>
           </a:p>
@@ -452,7 +458,7 @@
           <a:p>
             <a:fld id="{C25A0614-AFE8-4CA8-A782-9126583F0A08}" type="datetimeFigureOut">
               <a:rPr lang="es-ES" smtClean="0"/>
-              <a:t>06/06/2019</a:t>
+              <a:t>08/06/2019</a:t>
             </a:fld>
             <a:endParaRPr lang="es-ES"/>
           </a:p>
@@ -660,7 +666,7 @@
           <a:p>
             <a:fld id="{C25A0614-AFE8-4CA8-A782-9126583F0A08}" type="datetimeFigureOut">
               <a:rPr lang="es-ES" smtClean="0"/>
-              <a:t>06/06/2019</a:t>
+              <a:t>08/06/2019</a:t>
             </a:fld>
             <a:endParaRPr lang="es-ES"/>
           </a:p>
@@ -858,7 +864,7 @@
           <a:p>
             <a:fld id="{C25A0614-AFE8-4CA8-A782-9126583F0A08}" type="datetimeFigureOut">
               <a:rPr lang="es-ES" smtClean="0"/>
-              <a:t>06/06/2019</a:t>
+              <a:t>08/06/2019</a:t>
             </a:fld>
             <a:endParaRPr lang="es-ES"/>
           </a:p>
@@ -1133,7 +1139,7 @@
           <a:p>
             <a:fld id="{C25A0614-AFE8-4CA8-A782-9126583F0A08}" type="datetimeFigureOut">
               <a:rPr lang="es-ES" smtClean="0"/>
-              <a:t>06/06/2019</a:t>
+              <a:t>08/06/2019</a:t>
             </a:fld>
             <a:endParaRPr lang="es-ES"/>
           </a:p>
@@ -1398,7 +1404,7 @@
           <a:p>
             <a:fld id="{C25A0614-AFE8-4CA8-A782-9126583F0A08}" type="datetimeFigureOut">
               <a:rPr lang="es-ES" smtClean="0"/>
-              <a:t>06/06/2019</a:t>
+              <a:t>08/06/2019</a:t>
             </a:fld>
             <a:endParaRPr lang="es-ES"/>
           </a:p>
@@ -1810,7 +1816,7 @@
           <a:p>
             <a:fld id="{C25A0614-AFE8-4CA8-A782-9126583F0A08}" type="datetimeFigureOut">
               <a:rPr lang="es-ES" smtClean="0"/>
-              <a:t>06/06/2019</a:t>
+              <a:t>08/06/2019</a:t>
             </a:fld>
             <a:endParaRPr lang="es-ES"/>
           </a:p>
@@ -1951,7 +1957,7 @@
           <a:p>
             <a:fld id="{C25A0614-AFE8-4CA8-A782-9126583F0A08}" type="datetimeFigureOut">
               <a:rPr lang="es-ES" smtClean="0"/>
-              <a:t>06/06/2019</a:t>
+              <a:t>08/06/2019</a:t>
             </a:fld>
             <a:endParaRPr lang="es-ES"/>
           </a:p>
@@ -2064,7 +2070,7 @@
           <a:p>
             <a:fld id="{C25A0614-AFE8-4CA8-A782-9126583F0A08}" type="datetimeFigureOut">
               <a:rPr lang="es-ES" smtClean="0"/>
-              <a:t>06/06/2019</a:t>
+              <a:t>08/06/2019</a:t>
             </a:fld>
             <a:endParaRPr lang="es-ES"/>
           </a:p>
@@ -2375,7 +2381,7 @@
           <a:p>
             <a:fld id="{C25A0614-AFE8-4CA8-A782-9126583F0A08}" type="datetimeFigureOut">
               <a:rPr lang="es-ES" smtClean="0"/>
-              <a:t>06/06/2019</a:t>
+              <a:t>08/06/2019</a:t>
             </a:fld>
             <a:endParaRPr lang="es-ES"/>
           </a:p>
@@ -2663,7 +2669,7 @@
           <a:p>
             <a:fld id="{C25A0614-AFE8-4CA8-A782-9126583F0A08}" type="datetimeFigureOut">
               <a:rPr lang="es-ES" smtClean="0"/>
-              <a:t>06/06/2019</a:t>
+              <a:t>08/06/2019</a:t>
             </a:fld>
             <a:endParaRPr lang="es-ES"/>
           </a:p>
@@ -2904,7 +2910,7 @@
           <a:p>
             <a:fld id="{C25A0614-AFE8-4CA8-A782-9126583F0A08}" type="datetimeFigureOut">
               <a:rPr lang="es-ES" smtClean="0"/>
-              <a:t>06/06/2019</a:t>
+              <a:t>08/06/2019</a:t>
             </a:fld>
             <a:endParaRPr lang="es-ES"/>
           </a:p>
@@ -4370,6 +4376,1115 @@
 </p:sld>
 </file>
 
+<file path=ppt/slides/slide2.xml><?xml version="1.0" encoding="utf-8"?>
+<p:sld xmlns:a="http://schemas.openxmlformats.org/drawingml/2006/main" xmlns:r="http://schemas.openxmlformats.org/officeDocument/2006/relationships" xmlns:p="http://schemas.openxmlformats.org/presentationml/2006/main">
+  <p:cSld>
+    <p:spTree>
+      <p:nvGrpSpPr>
+        <p:cNvPr id="1" name=""/>
+        <p:cNvGrpSpPr/>
+        <p:nvPr/>
+      </p:nvGrpSpPr>
+      <p:grpSpPr>
+        <a:xfrm>
+          <a:off x="0" y="0"/>
+          <a:ext cx="0" cy="0"/>
+          <a:chOff x="0" y="0"/>
+          <a:chExt cx="0" cy="0"/>
+        </a:xfrm>
+      </p:grpSpPr>
+      <p:sp>
+        <p:nvSpPr>
+          <p:cNvPr id="4" name="Rectángulo 3">
+            <a:extLst>
+              <a:ext uri="{FF2B5EF4-FFF2-40B4-BE49-F238E27FC236}">
+                <a16:creationId xmlns:a16="http://schemas.microsoft.com/office/drawing/2014/main" id="{23289A1F-7EC9-4F0E-9560-CEFC06B0BB34}"/>
+              </a:ext>
+            </a:extLst>
+          </p:cNvPr>
+          <p:cNvSpPr/>
+          <p:nvPr/>
+        </p:nvSpPr>
+        <p:spPr>
+          <a:xfrm>
+            <a:off x="1955997" y="729000"/>
+            <a:ext cx="8280000" cy="5400000"/>
+          </a:xfrm>
+          <a:prstGeom prst="rect">
+            <a:avLst/>
+          </a:prstGeom>
+          <a:solidFill>
+            <a:schemeClr val="bg2"/>
+          </a:solidFill>
+        </p:spPr>
+        <p:style>
+          <a:lnRef idx="2">
+            <a:schemeClr val="accent1">
+              <a:shade val="50000"/>
+            </a:schemeClr>
+          </a:lnRef>
+          <a:fillRef idx="1">
+            <a:schemeClr val="accent1"/>
+          </a:fillRef>
+          <a:effectRef idx="0">
+            <a:schemeClr val="accent1"/>
+          </a:effectRef>
+          <a:fontRef idx="minor">
+            <a:schemeClr val="lt1"/>
+          </a:fontRef>
+        </p:style>
+        <p:txBody>
+          <a:bodyPr wrap="none" lIns="0" rtlCol="0" anchor="t" anchorCtr="0"/>
+          <a:lstStyle/>
+          <a:p>
+            <a:pPr algn="ctr"/>
+            <a:r>
+              <a:rPr lang="es-ES" dirty="0">
+                <a:solidFill>
+                  <a:sysClr val="windowText" lastClr="000000"/>
+                </a:solidFill>
+              </a:rPr>
+              <a:t>Gimnasio</a:t>
+            </a:r>
+          </a:p>
+        </p:txBody>
+      </p:sp>
+      <p:sp>
+        <p:nvSpPr>
+          <p:cNvPr id="6" name="Globo: flecha derecha e izquierda 5">
+            <a:extLst>
+              <a:ext uri="{FF2B5EF4-FFF2-40B4-BE49-F238E27FC236}">
+                <a16:creationId xmlns:a16="http://schemas.microsoft.com/office/drawing/2014/main" id="{C9F194C5-F911-454F-A610-44530046D91B}"/>
+              </a:ext>
+            </a:extLst>
+          </p:cNvPr>
+          <p:cNvSpPr/>
+          <p:nvPr/>
+        </p:nvSpPr>
+        <p:spPr>
+          <a:xfrm>
+            <a:off x="1456890" y="3561647"/>
+            <a:ext cx="998216" cy="2215661"/>
+          </a:xfrm>
+          <a:prstGeom prst="leftRightArrowCallout">
+            <a:avLst>
+              <a:gd name="adj1" fmla="val 17242"/>
+              <a:gd name="adj2" fmla="val 19828"/>
+              <a:gd name="adj3" fmla="val 26724"/>
+              <a:gd name="adj4" fmla="val 29310"/>
+            </a:avLst>
+          </a:prstGeom>
+          <a:solidFill>
+            <a:schemeClr val="accent6">
+              <a:lumMod val="20000"/>
+              <a:lumOff val="80000"/>
+            </a:schemeClr>
+          </a:solidFill>
+        </p:spPr>
+        <p:style>
+          <a:lnRef idx="2">
+            <a:schemeClr val="accent1">
+              <a:shade val="50000"/>
+            </a:schemeClr>
+          </a:lnRef>
+          <a:fillRef idx="1">
+            <a:schemeClr val="accent1"/>
+          </a:fillRef>
+          <a:effectRef idx="0">
+            <a:schemeClr val="accent1"/>
+          </a:effectRef>
+          <a:fontRef idx="minor">
+            <a:schemeClr val="lt1"/>
+          </a:fontRef>
+        </p:style>
+        <p:txBody>
+          <a:bodyPr vert="vert270" wrap="none" rtlCol="0" anchor="ctr" anchorCtr="0"/>
+          <a:lstStyle/>
+          <a:p>
+            <a:pPr algn="ctr"/>
+            <a:r>
+              <a:rPr lang="es-ES" dirty="0">
+                <a:solidFill>
+                  <a:schemeClr val="tx1"/>
+                </a:solidFill>
+              </a:rPr>
+              <a:t>Puerta almacén</a:t>
+            </a:r>
+          </a:p>
+        </p:txBody>
+      </p:sp>
+      <p:sp>
+        <p:nvSpPr>
+          <p:cNvPr id="7" name="Globo: flecha derecha e izquierda 6">
+            <a:extLst>
+              <a:ext uri="{FF2B5EF4-FFF2-40B4-BE49-F238E27FC236}">
+                <a16:creationId xmlns:a16="http://schemas.microsoft.com/office/drawing/2014/main" id="{1BA1C4AB-AE7E-4CEB-BD1A-0AE7B27B8EF6}"/>
+              </a:ext>
+            </a:extLst>
+          </p:cNvPr>
+          <p:cNvSpPr/>
+          <p:nvPr/>
+        </p:nvSpPr>
+        <p:spPr>
+          <a:xfrm rot="5400000">
+            <a:off x="5586046" y="5327068"/>
+            <a:ext cx="1019908" cy="1603864"/>
+          </a:xfrm>
+          <a:prstGeom prst="leftRightArrowCallout">
+            <a:avLst>
+              <a:gd name="adj1" fmla="val 17242"/>
+              <a:gd name="adj2" fmla="val 17960"/>
+              <a:gd name="adj3" fmla="val 26724"/>
+              <a:gd name="adj4" fmla="val 29310"/>
+            </a:avLst>
+          </a:prstGeom>
+          <a:solidFill>
+            <a:schemeClr val="accent5">
+              <a:lumMod val="20000"/>
+              <a:lumOff val="80000"/>
+            </a:schemeClr>
+          </a:solidFill>
+        </p:spPr>
+        <p:style>
+          <a:lnRef idx="2">
+            <a:schemeClr val="accent1">
+              <a:shade val="50000"/>
+            </a:schemeClr>
+          </a:lnRef>
+          <a:fillRef idx="1">
+            <a:schemeClr val="accent1"/>
+          </a:fillRef>
+          <a:effectRef idx="0">
+            <a:schemeClr val="accent1"/>
+          </a:effectRef>
+          <a:fontRef idx="minor">
+            <a:schemeClr val="lt1"/>
+          </a:fontRef>
+        </p:style>
+        <p:txBody>
+          <a:bodyPr vert="vert270" wrap="none" rtlCol="0" anchor="ctr">
+            <a:noAutofit/>
+          </a:bodyPr>
+          <a:lstStyle/>
+          <a:p>
+            <a:pPr algn="ctr"/>
+            <a:r>
+              <a:rPr lang="es-ES" dirty="0">
+                <a:solidFill>
+                  <a:schemeClr val="tx1"/>
+                </a:solidFill>
+              </a:rPr>
+              <a:t>Puerta principal</a:t>
+            </a:r>
+          </a:p>
+        </p:txBody>
+      </p:sp>
+      <p:cxnSp>
+        <p:nvCxnSpPr>
+          <p:cNvPr id="11" name="Conector recto 10">
+            <a:extLst>
+              <a:ext uri="{FF2B5EF4-FFF2-40B4-BE49-F238E27FC236}">
+                <a16:creationId xmlns:a16="http://schemas.microsoft.com/office/drawing/2014/main" id="{AB58906A-5E9D-4C5A-A334-8D553B8F2D5F}"/>
+              </a:ext>
+            </a:extLst>
+          </p:cNvPr>
+          <p:cNvCxnSpPr>
+            <a:cxnSpLocks/>
+          </p:cNvCxnSpPr>
+          <p:nvPr/>
+        </p:nvCxnSpPr>
+        <p:spPr>
+          <a:xfrm>
+            <a:off x="1955998" y="189000"/>
+            <a:ext cx="0" cy="540000"/>
+          </a:xfrm>
+          <a:prstGeom prst="line">
+            <a:avLst/>
+          </a:prstGeom>
+        </p:spPr>
+        <p:style>
+          <a:lnRef idx="1">
+            <a:schemeClr val="accent1"/>
+          </a:lnRef>
+          <a:fillRef idx="0">
+            <a:schemeClr val="accent1"/>
+          </a:fillRef>
+          <a:effectRef idx="0">
+            <a:schemeClr val="accent1"/>
+          </a:effectRef>
+          <a:fontRef idx="minor">
+            <a:schemeClr val="tx1"/>
+          </a:fontRef>
+        </p:style>
+      </p:cxnSp>
+      <p:cxnSp>
+        <p:nvCxnSpPr>
+          <p:cNvPr id="12" name="Conector recto 11">
+            <a:extLst>
+              <a:ext uri="{FF2B5EF4-FFF2-40B4-BE49-F238E27FC236}">
+                <a16:creationId xmlns:a16="http://schemas.microsoft.com/office/drawing/2014/main" id="{4A808E89-9D6F-4E76-AB05-F0324EEE4BE8}"/>
+              </a:ext>
+            </a:extLst>
+          </p:cNvPr>
+          <p:cNvCxnSpPr>
+            <a:cxnSpLocks/>
+          </p:cNvCxnSpPr>
+          <p:nvPr/>
+        </p:nvCxnSpPr>
+        <p:spPr>
+          <a:xfrm>
+            <a:off x="10236000" y="202538"/>
+            <a:ext cx="0" cy="526462"/>
+          </a:xfrm>
+          <a:prstGeom prst="line">
+            <a:avLst/>
+          </a:prstGeom>
+        </p:spPr>
+        <p:style>
+          <a:lnRef idx="1">
+            <a:schemeClr val="accent1"/>
+          </a:lnRef>
+          <a:fillRef idx="0">
+            <a:schemeClr val="accent1"/>
+          </a:fillRef>
+          <a:effectRef idx="0">
+            <a:schemeClr val="accent1"/>
+          </a:effectRef>
+          <a:fontRef idx="minor">
+            <a:schemeClr val="tx1"/>
+          </a:fontRef>
+        </p:style>
+      </p:cxnSp>
+      <p:cxnSp>
+        <p:nvCxnSpPr>
+          <p:cNvPr id="13" name="Conector recto 12">
+            <a:extLst>
+              <a:ext uri="{FF2B5EF4-FFF2-40B4-BE49-F238E27FC236}">
+                <a16:creationId xmlns:a16="http://schemas.microsoft.com/office/drawing/2014/main" id="{B8B6689B-6ED4-40B4-B908-00BBB27A2B65}"/>
+              </a:ext>
+            </a:extLst>
+          </p:cNvPr>
+          <p:cNvCxnSpPr/>
+          <p:nvPr/>
+        </p:nvCxnSpPr>
+        <p:spPr>
+          <a:xfrm>
+            <a:off x="5294068" y="5497079"/>
+            <a:ext cx="0" cy="540000"/>
+          </a:xfrm>
+          <a:prstGeom prst="line">
+            <a:avLst/>
+          </a:prstGeom>
+        </p:spPr>
+        <p:style>
+          <a:lnRef idx="1">
+            <a:schemeClr val="accent1"/>
+          </a:lnRef>
+          <a:fillRef idx="0">
+            <a:schemeClr val="accent1"/>
+          </a:fillRef>
+          <a:effectRef idx="0">
+            <a:schemeClr val="accent1"/>
+          </a:effectRef>
+          <a:fontRef idx="minor">
+            <a:schemeClr val="tx1"/>
+          </a:fontRef>
+        </p:style>
+      </p:cxnSp>
+      <p:cxnSp>
+        <p:nvCxnSpPr>
+          <p:cNvPr id="14" name="Conector recto 13">
+            <a:extLst>
+              <a:ext uri="{FF2B5EF4-FFF2-40B4-BE49-F238E27FC236}">
+                <a16:creationId xmlns:a16="http://schemas.microsoft.com/office/drawing/2014/main" id="{2D363694-1760-42F3-9FB7-0740884FA078}"/>
+              </a:ext>
+            </a:extLst>
+          </p:cNvPr>
+          <p:cNvCxnSpPr/>
+          <p:nvPr/>
+        </p:nvCxnSpPr>
+        <p:spPr>
+          <a:xfrm>
+            <a:off x="6897932" y="5497079"/>
+            <a:ext cx="0" cy="540000"/>
+          </a:xfrm>
+          <a:prstGeom prst="line">
+            <a:avLst/>
+          </a:prstGeom>
+        </p:spPr>
+        <p:style>
+          <a:lnRef idx="1">
+            <a:schemeClr val="accent1"/>
+          </a:lnRef>
+          <a:fillRef idx="0">
+            <a:schemeClr val="accent1"/>
+          </a:fillRef>
+          <a:effectRef idx="0">
+            <a:schemeClr val="accent1"/>
+          </a:effectRef>
+          <a:fontRef idx="minor">
+            <a:schemeClr val="tx1"/>
+          </a:fontRef>
+        </p:style>
+      </p:cxnSp>
+      <p:cxnSp>
+        <p:nvCxnSpPr>
+          <p:cNvPr id="20" name="Conector recto 19">
+            <a:extLst>
+              <a:ext uri="{FF2B5EF4-FFF2-40B4-BE49-F238E27FC236}">
+                <a16:creationId xmlns:a16="http://schemas.microsoft.com/office/drawing/2014/main" id="{0B0AF3B7-5B86-49C5-89CB-D477CF3370DF}"/>
+              </a:ext>
+            </a:extLst>
+          </p:cNvPr>
+          <p:cNvCxnSpPr>
+            <a:cxnSpLocks/>
+          </p:cNvCxnSpPr>
+          <p:nvPr/>
+        </p:nvCxnSpPr>
+        <p:spPr>
+          <a:xfrm rot="5400000">
+            <a:off x="10499231" y="465769"/>
+            <a:ext cx="0" cy="526462"/>
+          </a:xfrm>
+          <a:prstGeom prst="line">
+            <a:avLst/>
+          </a:prstGeom>
+        </p:spPr>
+        <p:style>
+          <a:lnRef idx="1">
+            <a:schemeClr val="accent1"/>
+          </a:lnRef>
+          <a:fillRef idx="0">
+            <a:schemeClr val="accent1"/>
+          </a:fillRef>
+          <a:effectRef idx="0">
+            <a:schemeClr val="accent1"/>
+          </a:effectRef>
+          <a:fontRef idx="minor">
+            <a:schemeClr val="tx1"/>
+          </a:fontRef>
+        </p:style>
+      </p:cxnSp>
+      <p:cxnSp>
+        <p:nvCxnSpPr>
+          <p:cNvPr id="21" name="Conector recto 20">
+            <a:extLst>
+              <a:ext uri="{FF2B5EF4-FFF2-40B4-BE49-F238E27FC236}">
+                <a16:creationId xmlns:a16="http://schemas.microsoft.com/office/drawing/2014/main" id="{F6BDD246-E5DB-47AF-8085-46F4A1B6C9BE}"/>
+              </a:ext>
+            </a:extLst>
+          </p:cNvPr>
+          <p:cNvCxnSpPr>
+            <a:cxnSpLocks/>
+          </p:cNvCxnSpPr>
+          <p:nvPr/>
+        </p:nvCxnSpPr>
+        <p:spPr>
+          <a:xfrm rot="5400000">
+            <a:off x="10499231" y="5865769"/>
+            <a:ext cx="0" cy="526462"/>
+          </a:xfrm>
+          <a:prstGeom prst="line">
+            <a:avLst/>
+          </a:prstGeom>
+        </p:spPr>
+        <p:style>
+          <a:lnRef idx="1">
+            <a:schemeClr val="accent1"/>
+          </a:lnRef>
+          <a:fillRef idx="0">
+            <a:schemeClr val="accent1"/>
+          </a:fillRef>
+          <a:effectRef idx="0">
+            <a:schemeClr val="accent1"/>
+          </a:effectRef>
+          <a:fontRef idx="minor">
+            <a:schemeClr val="tx1"/>
+          </a:fontRef>
+        </p:style>
+      </p:cxnSp>
+      <p:cxnSp>
+        <p:nvCxnSpPr>
+          <p:cNvPr id="22" name="Conector recto 21">
+            <a:extLst>
+              <a:ext uri="{FF2B5EF4-FFF2-40B4-BE49-F238E27FC236}">
+                <a16:creationId xmlns:a16="http://schemas.microsoft.com/office/drawing/2014/main" id="{808022A6-35F3-4A7E-A638-0F273E097715}"/>
+              </a:ext>
+            </a:extLst>
+          </p:cNvPr>
+          <p:cNvCxnSpPr>
+            <a:cxnSpLocks/>
+          </p:cNvCxnSpPr>
+          <p:nvPr/>
+        </p:nvCxnSpPr>
+        <p:spPr>
+          <a:xfrm rot="5400000">
+            <a:off x="2355356" y="3298416"/>
+            <a:ext cx="0" cy="526462"/>
+          </a:xfrm>
+          <a:prstGeom prst="line">
+            <a:avLst/>
+          </a:prstGeom>
+        </p:spPr>
+        <p:style>
+          <a:lnRef idx="1">
+            <a:schemeClr val="accent1"/>
+          </a:lnRef>
+          <a:fillRef idx="0">
+            <a:schemeClr val="accent1"/>
+          </a:fillRef>
+          <a:effectRef idx="0">
+            <a:schemeClr val="accent1"/>
+          </a:effectRef>
+          <a:fontRef idx="minor">
+            <a:schemeClr val="tx1"/>
+          </a:fontRef>
+        </p:style>
+      </p:cxnSp>
+      <p:cxnSp>
+        <p:nvCxnSpPr>
+          <p:cNvPr id="23" name="Conector recto 22">
+            <a:extLst>
+              <a:ext uri="{FF2B5EF4-FFF2-40B4-BE49-F238E27FC236}">
+                <a16:creationId xmlns:a16="http://schemas.microsoft.com/office/drawing/2014/main" id="{DD867BC4-7C7D-4E0E-9766-000302CF7B96}"/>
+              </a:ext>
+            </a:extLst>
+          </p:cNvPr>
+          <p:cNvCxnSpPr>
+            <a:cxnSpLocks/>
+          </p:cNvCxnSpPr>
+          <p:nvPr/>
+        </p:nvCxnSpPr>
+        <p:spPr>
+          <a:xfrm rot="5400000">
+            <a:off x="2362022" y="5503848"/>
+            <a:ext cx="0" cy="526462"/>
+          </a:xfrm>
+          <a:prstGeom prst="line">
+            <a:avLst/>
+          </a:prstGeom>
+        </p:spPr>
+        <p:style>
+          <a:lnRef idx="1">
+            <a:schemeClr val="accent1"/>
+          </a:lnRef>
+          <a:fillRef idx="0">
+            <a:schemeClr val="accent1"/>
+          </a:fillRef>
+          <a:effectRef idx="0">
+            <a:schemeClr val="accent1"/>
+          </a:effectRef>
+          <a:fontRef idx="minor">
+            <a:schemeClr val="tx1"/>
+          </a:fontRef>
+        </p:style>
+      </p:cxnSp>
+      <p:cxnSp>
+        <p:nvCxnSpPr>
+          <p:cNvPr id="25" name="Conector recto de flecha 24">
+            <a:extLst>
+              <a:ext uri="{FF2B5EF4-FFF2-40B4-BE49-F238E27FC236}">
+                <a16:creationId xmlns:a16="http://schemas.microsoft.com/office/drawing/2014/main" id="{21D554C2-C2C5-4DFF-BE8E-2E875DA5F34F}"/>
+              </a:ext>
+            </a:extLst>
+          </p:cNvPr>
+          <p:cNvCxnSpPr/>
+          <p:nvPr/>
+        </p:nvCxnSpPr>
+        <p:spPr>
+          <a:xfrm>
+            <a:off x="1955999" y="380044"/>
+            <a:ext cx="8280002" cy="0"/>
+          </a:xfrm>
+          <a:prstGeom prst="straightConnector1">
+            <a:avLst/>
+          </a:prstGeom>
+          <a:ln>
+            <a:headEnd type="triangle"/>
+            <a:tailEnd type="triangle"/>
+          </a:ln>
+        </p:spPr>
+        <p:style>
+          <a:lnRef idx="1">
+            <a:schemeClr val="accent1"/>
+          </a:lnRef>
+          <a:fillRef idx="0">
+            <a:schemeClr val="accent1"/>
+          </a:fillRef>
+          <a:effectRef idx="0">
+            <a:schemeClr val="accent1"/>
+          </a:effectRef>
+          <a:fontRef idx="minor">
+            <a:schemeClr val="tx1"/>
+          </a:fontRef>
+        </p:style>
+      </p:cxnSp>
+      <p:cxnSp>
+        <p:nvCxnSpPr>
+          <p:cNvPr id="27" name="Conector recto de flecha 26">
+            <a:extLst>
+              <a:ext uri="{FF2B5EF4-FFF2-40B4-BE49-F238E27FC236}">
+                <a16:creationId xmlns:a16="http://schemas.microsoft.com/office/drawing/2014/main" id="{57677F79-42FE-4A66-AA9D-80229D7403DA}"/>
+              </a:ext>
+            </a:extLst>
+          </p:cNvPr>
+          <p:cNvCxnSpPr/>
+          <p:nvPr/>
+        </p:nvCxnSpPr>
+        <p:spPr>
+          <a:xfrm>
+            <a:off x="10620375" y="729000"/>
+            <a:ext cx="0" cy="5400000"/>
+          </a:xfrm>
+          <a:prstGeom prst="straightConnector1">
+            <a:avLst/>
+          </a:prstGeom>
+          <a:ln>
+            <a:headEnd type="triangle"/>
+            <a:tailEnd type="triangle"/>
+          </a:ln>
+        </p:spPr>
+        <p:style>
+          <a:lnRef idx="1">
+            <a:schemeClr val="accent1"/>
+          </a:lnRef>
+          <a:fillRef idx="0">
+            <a:schemeClr val="accent1"/>
+          </a:fillRef>
+          <a:effectRef idx="0">
+            <a:schemeClr val="accent1"/>
+          </a:effectRef>
+          <a:fontRef idx="minor">
+            <a:schemeClr val="tx1"/>
+          </a:fontRef>
+        </p:style>
+      </p:cxnSp>
+      <p:cxnSp>
+        <p:nvCxnSpPr>
+          <p:cNvPr id="29" name="Conector recto de flecha 28">
+            <a:extLst>
+              <a:ext uri="{FF2B5EF4-FFF2-40B4-BE49-F238E27FC236}">
+                <a16:creationId xmlns:a16="http://schemas.microsoft.com/office/drawing/2014/main" id="{E8700927-EB2F-4784-B19C-2127749AD561}"/>
+              </a:ext>
+            </a:extLst>
+          </p:cNvPr>
+          <p:cNvCxnSpPr/>
+          <p:nvPr/>
+        </p:nvCxnSpPr>
+        <p:spPr>
+          <a:xfrm>
+            <a:off x="2521781" y="3561647"/>
+            <a:ext cx="0" cy="2205432"/>
+          </a:xfrm>
+          <a:prstGeom prst="straightConnector1">
+            <a:avLst/>
+          </a:prstGeom>
+          <a:ln>
+            <a:headEnd type="triangle"/>
+            <a:tailEnd type="triangle"/>
+          </a:ln>
+        </p:spPr>
+        <p:style>
+          <a:lnRef idx="1">
+            <a:schemeClr val="accent1"/>
+          </a:lnRef>
+          <a:fillRef idx="0">
+            <a:schemeClr val="accent1"/>
+          </a:fillRef>
+          <a:effectRef idx="0">
+            <a:schemeClr val="accent1"/>
+          </a:effectRef>
+          <a:fontRef idx="minor">
+            <a:schemeClr val="tx1"/>
+          </a:fontRef>
+        </p:style>
+      </p:cxnSp>
+      <p:cxnSp>
+        <p:nvCxnSpPr>
+          <p:cNvPr id="31" name="Conector recto de flecha 30">
+            <a:extLst>
+              <a:ext uri="{FF2B5EF4-FFF2-40B4-BE49-F238E27FC236}">
+                <a16:creationId xmlns:a16="http://schemas.microsoft.com/office/drawing/2014/main" id="{0E74D6EA-E5CD-49BF-8D09-C071E197F1D7}"/>
+              </a:ext>
+            </a:extLst>
+          </p:cNvPr>
+          <p:cNvCxnSpPr/>
+          <p:nvPr/>
+        </p:nvCxnSpPr>
+        <p:spPr>
+          <a:xfrm>
+            <a:off x="5294068" y="5524950"/>
+            <a:ext cx="1603864" cy="0"/>
+          </a:xfrm>
+          <a:prstGeom prst="straightConnector1">
+            <a:avLst/>
+          </a:prstGeom>
+          <a:ln>
+            <a:headEnd type="triangle"/>
+            <a:tailEnd type="triangle"/>
+          </a:ln>
+        </p:spPr>
+        <p:style>
+          <a:lnRef idx="1">
+            <a:schemeClr val="accent1"/>
+          </a:lnRef>
+          <a:fillRef idx="0">
+            <a:schemeClr val="accent1"/>
+          </a:fillRef>
+          <a:effectRef idx="0">
+            <a:schemeClr val="accent1"/>
+          </a:effectRef>
+          <a:fontRef idx="minor">
+            <a:schemeClr val="tx1"/>
+          </a:fontRef>
+        </p:style>
+      </p:cxnSp>
+      <p:sp>
+        <p:nvSpPr>
+          <p:cNvPr id="32" name="CuadroTexto 31">
+            <a:extLst>
+              <a:ext uri="{FF2B5EF4-FFF2-40B4-BE49-F238E27FC236}">
+                <a16:creationId xmlns:a16="http://schemas.microsoft.com/office/drawing/2014/main" id="{5E4E0EB9-5F90-42E2-8185-7BA7FB556FC3}"/>
+              </a:ext>
+            </a:extLst>
+          </p:cNvPr>
+          <p:cNvSpPr txBox="1"/>
+          <p:nvPr/>
+        </p:nvSpPr>
+        <p:spPr>
+          <a:xfrm>
+            <a:off x="5524500" y="51382"/>
+            <a:ext cx="1181095" cy="369332"/>
+          </a:xfrm>
+          <a:prstGeom prst="rect">
+            <a:avLst/>
+          </a:prstGeom>
+          <a:noFill/>
+        </p:spPr>
+        <p:txBody>
+          <a:bodyPr wrap="square" rtlCol="0" anchor="ctr" anchorCtr="0">
+            <a:spAutoFit/>
+          </a:bodyPr>
+          <a:lstStyle/>
+          <a:p>
+            <a:pPr algn="ctr"/>
+            <a:r>
+              <a:rPr lang="es-ES" dirty="0"/>
+              <a:t>17 m</a:t>
+            </a:r>
+          </a:p>
+        </p:txBody>
+      </p:sp>
+      <p:sp>
+        <p:nvSpPr>
+          <p:cNvPr id="33" name="CuadroTexto 32">
+            <a:extLst>
+              <a:ext uri="{FF2B5EF4-FFF2-40B4-BE49-F238E27FC236}">
+                <a16:creationId xmlns:a16="http://schemas.microsoft.com/office/drawing/2014/main" id="{ED6C825E-47FD-4DE3-8288-12366C95E142}"/>
+              </a:ext>
+            </a:extLst>
+          </p:cNvPr>
+          <p:cNvSpPr txBox="1"/>
+          <p:nvPr/>
+        </p:nvSpPr>
+        <p:spPr>
+          <a:xfrm>
+            <a:off x="10620374" y="3145109"/>
+            <a:ext cx="877083" cy="369332"/>
+          </a:xfrm>
+          <a:prstGeom prst="rect">
+            <a:avLst/>
+          </a:prstGeom>
+          <a:noFill/>
+        </p:spPr>
+        <p:txBody>
+          <a:bodyPr wrap="square" rtlCol="0">
+            <a:spAutoFit/>
+          </a:bodyPr>
+          <a:lstStyle/>
+          <a:p>
+            <a:r>
+              <a:rPr lang="es-ES" dirty="0"/>
+              <a:t>10 m</a:t>
+            </a:r>
+          </a:p>
+        </p:txBody>
+      </p:sp>
+      <p:sp>
+        <p:nvSpPr>
+          <p:cNvPr id="34" name="CuadroTexto 33">
+            <a:extLst>
+              <a:ext uri="{FF2B5EF4-FFF2-40B4-BE49-F238E27FC236}">
+                <a16:creationId xmlns:a16="http://schemas.microsoft.com/office/drawing/2014/main" id="{1D8E8418-2D45-4363-A2E6-8B8B5FF9E70B}"/>
+              </a:ext>
+            </a:extLst>
+          </p:cNvPr>
+          <p:cNvSpPr txBox="1"/>
+          <p:nvPr/>
+        </p:nvSpPr>
+        <p:spPr>
+          <a:xfrm>
+            <a:off x="5719762" y="5108571"/>
+            <a:ext cx="790569" cy="369332"/>
+          </a:xfrm>
+          <a:prstGeom prst="rect">
+            <a:avLst/>
+          </a:prstGeom>
+          <a:noFill/>
+        </p:spPr>
+        <p:txBody>
+          <a:bodyPr wrap="square" rtlCol="0">
+            <a:spAutoFit/>
+          </a:bodyPr>
+          <a:lstStyle/>
+          <a:p>
+            <a:pPr algn="ctr"/>
+            <a:r>
+              <a:rPr lang="es-ES" dirty="0"/>
+              <a:t> X m</a:t>
+            </a:r>
+          </a:p>
+        </p:txBody>
+      </p:sp>
+      <p:sp>
+        <p:nvSpPr>
+          <p:cNvPr id="35" name="CuadroTexto 34">
+            <a:extLst>
+              <a:ext uri="{FF2B5EF4-FFF2-40B4-BE49-F238E27FC236}">
+                <a16:creationId xmlns:a16="http://schemas.microsoft.com/office/drawing/2014/main" id="{965DCAE1-F76B-49BA-B259-CDBADECFE7DC}"/>
+              </a:ext>
+            </a:extLst>
+          </p:cNvPr>
+          <p:cNvSpPr txBox="1"/>
+          <p:nvPr/>
+        </p:nvSpPr>
+        <p:spPr>
+          <a:xfrm>
+            <a:off x="2625253" y="4479698"/>
+            <a:ext cx="877084" cy="369332"/>
+          </a:xfrm>
+          <a:prstGeom prst="rect">
+            <a:avLst/>
+          </a:prstGeom>
+          <a:noFill/>
+        </p:spPr>
+        <p:txBody>
+          <a:bodyPr wrap="square" rtlCol="0">
+            <a:spAutoFit/>
+          </a:bodyPr>
+          <a:lstStyle/>
+          <a:p>
+            <a:r>
+              <a:rPr lang="es-ES" dirty="0"/>
+              <a:t>X m</a:t>
+            </a:r>
+          </a:p>
+        </p:txBody>
+      </p:sp>
+      <p:sp>
+        <p:nvSpPr>
+          <p:cNvPr id="37" name="Elipse 36">
+            <a:extLst>
+              <a:ext uri="{FF2B5EF4-FFF2-40B4-BE49-F238E27FC236}">
+                <a16:creationId xmlns:a16="http://schemas.microsoft.com/office/drawing/2014/main" id="{1BF0E08B-27DA-4F50-B3CB-CACA7A32CC89}"/>
+              </a:ext>
+            </a:extLst>
+          </p:cNvPr>
+          <p:cNvSpPr/>
+          <p:nvPr/>
+        </p:nvSpPr>
+        <p:spPr>
+          <a:xfrm>
+            <a:off x="4127624" y="1700846"/>
+            <a:ext cx="540000" cy="540000"/>
+          </a:xfrm>
+          <a:prstGeom prst="ellipse">
+            <a:avLst/>
+          </a:prstGeom>
+        </p:spPr>
+        <p:style>
+          <a:lnRef idx="2">
+            <a:schemeClr val="accent1">
+              <a:shade val="50000"/>
+            </a:schemeClr>
+          </a:lnRef>
+          <a:fillRef idx="1">
+            <a:schemeClr val="accent1"/>
+          </a:fillRef>
+          <a:effectRef idx="0">
+            <a:schemeClr val="accent1"/>
+          </a:effectRef>
+          <a:fontRef idx="minor">
+            <a:schemeClr val="lt1"/>
+          </a:fontRef>
+        </p:style>
+        <p:txBody>
+          <a:bodyPr rtlCol="0" anchor="ctr"/>
+          <a:lstStyle/>
+          <a:p>
+            <a:pPr algn="ctr"/>
+            <a:r>
+              <a:rPr lang="es-ES" dirty="0"/>
+              <a:t>3</a:t>
+            </a:r>
+          </a:p>
+        </p:txBody>
+      </p:sp>
+      <p:sp>
+        <p:nvSpPr>
+          <p:cNvPr id="38" name="Elipse 37">
+            <a:extLst>
+              <a:ext uri="{FF2B5EF4-FFF2-40B4-BE49-F238E27FC236}">
+                <a16:creationId xmlns:a16="http://schemas.microsoft.com/office/drawing/2014/main" id="{ED790920-AB68-465B-9B63-277549AF5032}"/>
+              </a:ext>
+            </a:extLst>
+          </p:cNvPr>
+          <p:cNvSpPr/>
+          <p:nvPr/>
+        </p:nvSpPr>
+        <p:spPr>
+          <a:xfrm>
+            <a:off x="7524377" y="1700846"/>
+            <a:ext cx="540000" cy="540000"/>
+          </a:xfrm>
+          <a:prstGeom prst="ellipse">
+            <a:avLst/>
+          </a:prstGeom>
+        </p:spPr>
+        <p:style>
+          <a:lnRef idx="2">
+            <a:schemeClr val="accent1">
+              <a:shade val="50000"/>
+            </a:schemeClr>
+          </a:lnRef>
+          <a:fillRef idx="1">
+            <a:schemeClr val="accent1"/>
+          </a:fillRef>
+          <a:effectRef idx="0">
+            <a:schemeClr val="accent1"/>
+          </a:effectRef>
+          <a:fontRef idx="minor">
+            <a:schemeClr val="lt1"/>
+          </a:fontRef>
+        </p:style>
+        <p:txBody>
+          <a:bodyPr rtlCol="0" anchor="ctr"/>
+          <a:lstStyle/>
+          <a:p>
+            <a:pPr algn="ctr"/>
+            <a:r>
+              <a:rPr lang="es-ES" dirty="0"/>
+              <a:t>1</a:t>
+            </a:r>
+          </a:p>
+        </p:txBody>
+      </p:sp>
+      <p:sp>
+        <p:nvSpPr>
+          <p:cNvPr id="39" name="Elipse 38">
+            <a:extLst>
+              <a:ext uri="{FF2B5EF4-FFF2-40B4-BE49-F238E27FC236}">
+                <a16:creationId xmlns:a16="http://schemas.microsoft.com/office/drawing/2014/main" id="{8F27D8D5-F4DF-49EC-80AF-24A3085C3841}"/>
+              </a:ext>
+            </a:extLst>
+          </p:cNvPr>
+          <p:cNvSpPr/>
+          <p:nvPr/>
+        </p:nvSpPr>
+        <p:spPr>
+          <a:xfrm>
+            <a:off x="7524377" y="4617154"/>
+            <a:ext cx="540000" cy="540000"/>
+          </a:xfrm>
+          <a:prstGeom prst="ellipse">
+            <a:avLst/>
+          </a:prstGeom>
+        </p:spPr>
+        <p:style>
+          <a:lnRef idx="2">
+            <a:schemeClr val="accent1">
+              <a:shade val="50000"/>
+            </a:schemeClr>
+          </a:lnRef>
+          <a:fillRef idx="1">
+            <a:schemeClr val="accent1"/>
+          </a:fillRef>
+          <a:effectRef idx="0">
+            <a:schemeClr val="accent1"/>
+          </a:effectRef>
+          <a:fontRef idx="minor">
+            <a:schemeClr val="lt1"/>
+          </a:fontRef>
+        </p:style>
+        <p:txBody>
+          <a:bodyPr rtlCol="0" anchor="ctr"/>
+          <a:lstStyle/>
+          <a:p>
+            <a:pPr algn="ctr"/>
+            <a:r>
+              <a:rPr lang="es-ES" dirty="0"/>
+              <a:t>2</a:t>
+            </a:r>
+          </a:p>
+        </p:txBody>
+      </p:sp>
+      <p:sp>
+        <p:nvSpPr>
+          <p:cNvPr id="40" name="Elipse 39">
+            <a:extLst>
+              <a:ext uri="{FF2B5EF4-FFF2-40B4-BE49-F238E27FC236}">
+                <a16:creationId xmlns:a16="http://schemas.microsoft.com/office/drawing/2014/main" id="{AD61030F-EB00-4B3E-891C-51AE919C0730}"/>
+              </a:ext>
+            </a:extLst>
+          </p:cNvPr>
+          <p:cNvSpPr/>
+          <p:nvPr/>
+        </p:nvSpPr>
+        <p:spPr>
+          <a:xfrm>
+            <a:off x="4127624" y="4579030"/>
+            <a:ext cx="540000" cy="540000"/>
+          </a:xfrm>
+          <a:prstGeom prst="ellipse">
+            <a:avLst/>
+          </a:prstGeom>
+        </p:spPr>
+        <p:style>
+          <a:lnRef idx="2">
+            <a:schemeClr val="accent1">
+              <a:shade val="50000"/>
+            </a:schemeClr>
+          </a:lnRef>
+          <a:fillRef idx="1">
+            <a:schemeClr val="accent1"/>
+          </a:fillRef>
+          <a:effectRef idx="0">
+            <a:schemeClr val="accent1"/>
+          </a:effectRef>
+          <a:fontRef idx="minor">
+            <a:schemeClr val="lt1"/>
+          </a:fontRef>
+        </p:style>
+        <p:txBody>
+          <a:bodyPr rtlCol="0" anchor="ctr"/>
+          <a:lstStyle/>
+          <a:p>
+            <a:pPr algn="ctr"/>
+            <a:r>
+              <a:rPr lang="es-ES" dirty="0"/>
+              <a:t>4</a:t>
+            </a:r>
+          </a:p>
+        </p:txBody>
+      </p:sp>
+      <p:sp>
+        <p:nvSpPr>
+          <p:cNvPr id="41" name="Flecha: hacia abajo 40">
+            <a:extLst>
+              <a:ext uri="{FF2B5EF4-FFF2-40B4-BE49-F238E27FC236}">
+                <a16:creationId xmlns:a16="http://schemas.microsoft.com/office/drawing/2014/main" id="{F86F4331-8B6B-4C00-8D67-65A9B15F7C12}"/>
+              </a:ext>
+            </a:extLst>
+          </p:cNvPr>
+          <p:cNvSpPr/>
+          <p:nvPr/>
+        </p:nvSpPr>
+        <p:spPr>
+          <a:xfrm rot="18545326">
+            <a:off x="3285334" y="1409730"/>
+            <a:ext cx="311462" cy="540000"/>
+          </a:xfrm>
+          <a:prstGeom prst="downArrow">
+            <a:avLst/>
+          </a:prstGeom>
+        </p:spPr>
+        <p:style>
+          <a:lnRef idx="2">
+            <a:schemeClr val="accent1">
+              <a:shade val="50000"/>
+            </a:schemeClr>
+          </a:lnRef>
+          <a:fillRef idx="1">
+            <a:schemeClr val="accent1"/>
+          </a:fillRef>
+          <a:effectRef idx="0">
+            <a:schemeClr val="accent1"/>
+          </a:effectRef>
+          <a:fontRef idx="minor">
+            <a:schemeClr val="lt1"/>
+          </a:fontRef>
+        </p:style>
+        <p:txBody>
+          <a:bodyPr rtlCol="0" anchor="ctr"/>
+          <a:lstStyle/>
+          <a:p>
+            <a:pPr algn="ctr"/>
+            <a:endParaRPr lang="es-ES"/>
+          </a:p>
+        </p:txBody>
+      </p:sp>
+      <p:sp>
+        <p:nvSpPr>
+          <p:cNvPr id="42" name="Nube 41">
+            <a:extLst>
+              <a:ext uri="{FF2B5EF4-FFF2-40B4-BE49-F238E27FC236}">
+                <a16:creationId xmlns:a16="http://schemas.microsoft.com/office/drawing/2014/main" id="{B4E027F7-A629-4BF9-82C5-743501E4A137}"/>
+              </a:ext>
+            </a:extLst>
+          </p:cNvPr>
+          <p:cNvSpPr/>
+          <p:nvPr/>
+        </p:nvSpPr>
+        <p:spPr>
+          <a:xfrm>
+            <a:off x="2784628" y="1099742"/>
+            <a:ext cx="656437" cy="628650"/>
+          </a:xfrm>
+          <a:prstGeom prst="cloud">
+            <a:avLst/>
+          </a:prstGeom>
+        </p:spPr>
+        <p:style>
+          <a:lnRef idx="2">
+            <a:schemeClr val="accent1">
+              <a:shade val="50000"/>
+            </a:schemeClr>
+          </a:lnRef>
+          <a:fillRef idx="1">
+            <a:schemeClr val="accent1"/>
+          </a:fillRef>
+          <a:effectRef idx="0">
+            <a:schemeClr val="accent1"/>
+          </a:effectRef>
+          <a:fontRef idx="minor">
+            <a:schemeClr val="lt1"/>
+          </a:fontRef>
+        </p:style>
+        <p:txBody>
+          <a:bodyPr rtlCol="0" anchor="ctr"/>
+          <a:lstStyle/>
+          <a:p>
+            <a:pPr algn="ctr"/>
+            <a:r>
+              <a:rPr lang="es-ES" dirty="0"/>
+              <a:t>0</a:t>
+            </a:r>
+          </a:p>
+        </p:txBody>
+      </p:sp>
+    </p:spTree>
+    <p:extLst>
+      <p:ext uri="{BB962C8B-B14F-4D97-AF65-F5344CB8AC3E}">
+        <p14:creationId xmlns:p14="http://schemas.microsoft.com/office/powerpoint/2010/main" val="3388541497"/>
+      </p:ext>
+    </p:extLst>
+  </p:cSld>
+  <p:clrMapOvr>
+    <a:masterClrMapping/>
+  </p:clrMapOvr>
+</p:sld>
+</file>
+
 <file path=ppt/theme/theme1.xml><?xml version="1.0" encoding="utf-8"?>
 <a:theme xmlns:a="http://schemas.openxmlformats.org/drawingml/2006/main" name="Tema de Office">
   <a:themeElements>

</xml_diff>